<commit_message>
Added the logo to the power point
</commit_message>
<xml_diff>
--- a/The Art of Finding.pptx
+++ b/The Art of Finding.pptx
@@ -109,7 +109,16 @@
       </a:defRPr>
     </a:lvl9pPr>
   </p:defaultTextStyle>
+  <p:extLst>
+    <p:ext uri="{EFAFB233-063F-42B5-8137-9DF3F51BA10A}">
+      <p15:sldGuideLst xmlns:p15="http://schemas.microsoft.com/office/powerpoint/2012/main"/>
+    </p:ext>
+  </p:extLst>
 </p:presentation>
+</file>
+
+<file path=ppt/revisionInfo.xml><?xml version="1.0" encoding="utf-8"?>
+<p1510:revInfo xmlns:a="http://schemas.openxmlformats.org/drawingml/2006/main" xmlns:r="http://schemas.openxmlformats.org/officeDocument/2006/relationships" xmlns:p1510="http://schemas.microsoft.com/office/powerpoint/2015/10/main"/>
 </file>
 
 <file path=ppt/slideLayouts/slideLayout1.xml><?xml version="1.0" encoding="utf-8"?>
@@ -298,7 +307,7 @@
           <a:p>
             <a:fld id="{4AAD347D-5ACD-4C99-B74B-A9C85AD731AF}" type="datetimeFigureOut">
               <a:rPr lang="en-US" dirty="0"/>
-              <a:t>12/18/2017</a:t>
+              <a:t>12/21/2017</a:t>
             </a:fld>
             <a:endParaRPr lang="en-US" dirty="0"/>
           </a:p>
@@ -568,7 +577,7 @@
           <a:p>
             <a:fld id="{4509A250-FF31-4206-8172-F9D3106AACB1}" type="datetimeFigureOut">
               <a:rPr lang="en-US" dirty="0"/>
-              <a:t>12/18/2017</a:t>
+              <a:t>12/21/2017</a:t>
             </a:fld>
             <a:endParaRPr lang="en-US" dirty="0"/>
           </a:p>
@@ -757,7 +766,7 @@
           <a:p>
             <a:fld id="{4509A250-FF31-4206-8172-F9D3106AACB1}" type="datetimeFigureOut">
               <a:rPr lang="en-US" dirty="0"/>
-              <a:t>12/18/2017</a:t>
+              <a:t>12/21/2017</a:t>
             </a:fld>
             <a:endParaRPr lang="en-US" dirty="0"/>
           </a:p>
@@ -1025,7 +1034,7 @@
           <a:p>
             <a:fld id="{4509A250-FF31-4206-8172-F9D3106AACB1}" type="datetimeFigureOut">
               <a:rPr lang="en-US" dirty="0"/>
-              <a:t>12/18/2017</a:t>
+              <a:t>12/21/2017</a:t>
             </a:fld>
             <a:endParaRPr lang="en-US" dirty="0"/>
           </a:p>
@@ -1361,7 +1370,7 @@
           <a:p>
             <a:fld id="{4509A250-FF31-4206-8172-F9D3106AACB1}" type="datetimeFigureOut">
               <a:rPr lang="en-US" dirty="0"/>
-              <a:t>12/18/2017</a:t>
+              <a:t>12/21/2017</a:t>
             </a:fld>
             <a:endParaRPr lang="en-US" dirty="0"/>
           </a:p>
@@ -1979,7 +1988,7 @@
           <a:p>
             <a:fld id="{4509A250-FF31-4206-8172-F9D3106AACB1}" type="datetimeFigureOut">
               <a:rPr lang="en-US" dirty="0"/>
-              <a:t>12/18/2017</a:t>
+              <a:t>12/21/2017</a:t>
             </a:fld>
             <a:endParaRPr lang="en-US" dirty="0"/>
           </a:p>
@@ -2834,7 +2843,7 @@
           <a:p>
             <a:fld id="{4509A250-FF31-4206-8172-F9D3106AACB1}" type="datetimeFigureOut">
               <a:rPr lang="en-US" dirty="0"/>
-              <a:t>12/18/2017</a:t>
+              <a:t>12/21/2017</a:t>
             </a:fld>
             <a:endParaRPr lang="en-US" dirty="0"/>
           </a:p>
@@ -2999,7 +3008,7 @@
           <a:p>
             <a:fld id="{4509A250-FF31-4206-8172-F9D3106AACB1}" type="datetimeFigureOut">
               <a:rPr lang="en-US" dirty="0"/>
-              <a:t>12/18/2017</a:t>
+              <a:t>12/21/2017</a:t>
             </a:fld>
             <a:endParaRPr lang="en-US" dirty="0"/>
           </a:p>
@@ -3174,7 +3183,7 @@
           <a:p>
             <a:fld id="{4509A250-FF31-4206-8172-F9D3106AACB1}" type="datetimeFigureOut">
               <a:rPr lang="en-US" dirty="0"/>
-              <a:t>12/18/2017</a:t>
+              <a:t>12/21/2017</a:t>
             </a:fld>
             <a:endParaRPr lang="en-US" dirty="0"/>
           </a:p>
@@ -3339,7 +3348,7 @@
           <a:p>
             <a:fld id="{4509A250-FF31-4206-8172-F9D3106AACB1}" type="datetimeFigureOut">
               <a:rPr lang="en-US" dirty="0"/>
-              <a:t>12/18/2017</a:t>
+              <a:t>12/21/2017</a:t>
             </a:fld>
             <a:endParaRPr lang="en-US" dirty="0"/>
           </a:p>
@@ -3581,7 +3590,7 @@
           <a:p>
             <a:fld id="{9796027F-7875-4030-9381-8BD8C4F21935}" type="datetimeFigureOut">
               <a:rPr lang="en-US" dirty="0"/>
-              <a:t>12/18/2017</a:t>
+              <a:t>12/21/2017</a:t>
             </a:fld>
             <a:endParaRPr lang="en-US" dirty="0"/>
           </a:p>
@@ -3868,7 +3877,7 @@
           <a:p>
             <a:fld id="{9796027F-7875-4030-9381-8BD8C4F21935}" type="datetimeFigureOut">
               <a:rPr lang="en-US" dirty="0"/>
-              <a:t>12/18/2017</a:t>
+              <a:t>12/21/2017</a:t>
             </a:fld>
             <a:endParaRPr lang="en-US" dirty="0"/>
           </a:p>
@@ -4307,7 +4316,7 @@
           <a:p>
             <a:fld id="{9796027F-7875-4030-9381-8BD8C4F21935}" type="datetimeFigureOut">
               <a:rPr lang="en-US" dirty="0"/>
-              <a:t>12/18/2017</a:t>
+              <a:t>12/21/2017</a:t>
             </a:fld>
             <a:endParaRPr lang="en-US" dirty="0"/>
           </a:p>
@@ -4420,7 +4429,7 @@
           <a:p>
             <a:fld id="{4509A250-FF31-4206-8172-F9D3106AACB1}" type="datetimeFigureOut">
               <a:rPr lang="en-US" dirty="0"/>
-              <a:t>12/18/2017</a:t>
+              <a:t>12/21/2017</a:t>
             </a:fld>
             <a:endParaRPr lang="en-US" dirty="0"/>
           </a:p>
@@ -4510,7 +4519,7 @@
           <a:p>
             <a:fld id="{4509A250-FF31-4206-8172-F9D3106AACB1}" type="datetimeFigureOut">
               <a:rPr lang="en-US" dirty="0"/>
-              <a:t>12/18/2017</a:t>
+              <a:t>12/21/2017</a:t>
             </a:fld>
             <a:endParaRPr lang="en-US" dirty="0"/>
           </a:p>
@@ -4784,7 +4793,7 @@
           <a:p>
             <a:fld id="{4509A250-FF31-4206-8172-F9D3106AACB1}" type="datetimeFigureOut">
               <a:rPr lang="en-US" dirty="0"/>
-              <a:t>12/18/2017</a:t>
+              <a:t>12/21/2017</a:t>
             </a:fld>
             <a:endParaRPr lang="en-US" dirty="0"/>
           </a:p>
@@ -5054,7 +5063,7 @@
           <a:p>
             <a:fld id="{4509A250-FF31-4206-8172-F9D3106AACB1}" type="datetimeFigureOut">
               <a:rPr lang="en-US" dirty="0"/>
-              <a:t>12/18/2017</a:t>
+              <a:t>12/21/2017</a:t>
             </a:fld>
             <a:endParaRPr lang="en-US" dirty="0"/>
           </a:p>
@@ -5478,7 +5487,7 @@
           <a:p>
             <a:fld id="{4AAD347D-5ACD-4C99-B74B-A9C85AD731AF}" type="datetimeFigureOut">
               <a:rPr lang="en-US" dirty="0"/>
-              <a:t>12/18/2017</a:t>
+              <a:t>12/21/2017</a:t>
             </a:fld>
             <a:endParaRPr lang="en-US" dirty="0"/>
           </a:p>
@@ -6067,51 +6076,34 @@
       </p:sp>
       <p:pic>
         <p:nvPicPr>
-          <p:cNvPr id="1026" name="Picture 2" descr="Related image">
+          <p:cNvPr id="5" name="Content Placeholder 4">
             <a:extLst>
               <a:ext uri="{FF2B5EF4-FFF2-40B4-BE49-F238E27FC236}">
-                <a16:creationId xmlns:a16="http://schemas.microsoft.com/office/drawing/2014/main" id="{5D97F90E-9BD0-430D-A768-5C41855DF4E2}"/>
+                <a16:creationId xmlns:a16="http://schemas.microsoft.com/office/drawing/2014/main" id="{E5199DFE-7F2B-4502-BAC5-C9F44C4089BB}"/>
               </a:ext>
             </a:extLst>
           </p:cNvPr>
           <p:cNvPicPr>
-            <a:picLocks noGrp="1" noChangeAspect="1" noChangeArrowheads="1"/>
+            <a:picLocks noGrp="1" noChangeAspect="1"/>
           </p:cNvPicPr>
           <p:nvPr>
             <p:ph sz="half" idx="2"/>
           </p:nvPr>
         </p:nvPicPr>
         <p:blipFill>
-          <a:blip r:embed="rId2">
-            <a:extLst>
-              <a:ext uri="{28A0092B-C50C-407E-A947-70E740481C1C}">
-                <a14:useLocalDpi xmlns:a14="http://schemas.microsoft.com/office/drawing/2010/main" val="0"/>
-              </a:ext>
-            </a:extLst>
-          </a:blip>
-          <a:srcRect/>
+          <a:blip r:embed="rId2"/>
           <a:stretch>
             <a:fillRect/>
           </a:stretch>
         </p:blipFill>
-        <p:spPr bwMode="auto">
+        <p:spPr>
           <a:xfrm>
-            <a:off x="6470542" y="2055813"/>
-            <a:ext cx="2764054" cy="4200525"/>
+            <a:off x="6033661" y="2055813"/>
+            <a:ext cx="4200525" cy="4200525"/>
           </a:xfrm>
           <a:prstGeom prst="rect">
             <a:avLst/>
           </a:prstGeom>
-          <a:noFill/>
-          <a:extLst>
-            <a:ext uri="{909E8E84-426E-40DD-AFC4-6F175D3DCCD1}">
-              <a14:hiddenFill xmlns:a14="http://schemas.microsoft.com/office/drawing/2010/main">
-                <a:solidFill>
-                  <a:srgbClr val="FFFFFF"/>
-                </a:solidFill>
-              </a14:hiddenFill>
-            </a:ext>
-          </a:extLst>
         </p:spPr>
       </p:pic>
     </p:spTree>
@@ -6376,6 +6368,15 @@
                 <a:cs typeface="Arial" panose="020B0604020202020204" pitchFamily="34" charset="0"/>
               </a:rPr>
               <a:t>You can purchase images of the artwork from Amazon.</a:t>
+            </a:r>
+          </a:p>
+          <a:p>
+            <a:r>
+              <a:rPr lang="en-US" sz="2400" dirty="0">
+                <a:latin typeface="Arial" panose="020B0604020202020204" pitchFamily="34" charset="0"/>
+                <a:cs typeface="Arial" panose="020B0604020202020204" pitchFamily="34" charset="0"/>
+              </a:rPr>
+              <a:t>You can view artwork in Galleries via Google Maps</a:t>
             </a:r>
             <a:endParaRPr lang="en-US" sz="2400" dirty="0"/>
           </a:p>

</xml_diff>